<commit_message>
Added more to the presentation
</commit_message>
<xml_diff>
--- a/Presentation.pptx
+++ b/Presentation.pptx
@@ -109,6 +109,11 @@
       </a:defRPr>
     </a:lvl9pPr>
   </p:defaultTextStyle>
+  <p:extLst>
+    <p:ext uri="{EFAFB233-063F-42B5-8137-9DF3F51BA10A}">
+      <p15:sldGuideLst xmlns:p15="http://schemas.microsoft.com/office/powerpoint/2012/main"/>
+    </p:ext>
+  </p:extLst>
 </p:presentation>
 </file>
 
@@ -4414,7 +4419,7 @@
           <a:p>
             <a:pPr algn="ctr"/>
             <a:r>
-              <a:rPr lang="en-IE" dirty="0"/>
+              <a:rPr lang="en-IE" u="sng" dirty="0"/>
               <a:t>Table of Contents</a:t>
             </a:r>
           </a:p>
@@ -4450,10 +4455,12 @@
               <a:lnSpc>
                 <a:spcPct val="250000"/>
               </a:lnSpc>
+              <a:buFont typeface="Wingdings" panose="05000000000000000000" pitchFamily="2" charset="2"/>
+              <a:buChar char="v"/>
             </a:pPr>
             <a:r>
               <a:rPr lang="en-IE" sz="2800" spc="300" dirty="0"/>
-              <a:t>Aims &amp; Objectives</a:t>
+              <a:t> Aims &amp; Objectives</a:t>
             </a:r>
           </a:p>
           <a:p>
@@ -4461,10 +4468,12 @@
               <a:lnSpc>
                 <a:spcPct val="250000"/>
               </a:lnSpc>
+              <a:buFont typeface="Wingdings" panose="05000000000000000000" pitchFamily="2" charset="2"/>
+              <a:buChar char="v"/>
             </a:pPr>
             <a:r>
               <a:rPr lang="en-IE" sz="2800" spc="300" dirty="0"/>
-              <a:t>Architecture of the Solution</a:t>
+              <a:t> Architecture of the Solution</a:t>
             </a:r>
           </a:p>
           <a:p>
@@ -4472,10 +4481,12 @@
               <a:lnSpc>
                 <a:spcPct val="250000"/>
               </a:lnSpc>
+              <a:buFont typeface="Wingdings" panose="05000000000000000000" pitchFamily="2" charset="2"/>
+              <a:buChar char="v"/>
             </a:pPr>
             <a:r>
               <a:rPr lang="en-IE" sz="2800" spc="300" dirty="0"/>
-              <a:t>Problems Encountered</a:t>
+              <a:t> Problems Encountered</a:t>
             </a:r>
           </a:p>
           <a:p>
@@ -4483,10 +4494,12 @@
               <a:lnSpc>
                 <a:spcPct val="250000"/>
               </a:lnSpc>
+              <a:buFont typeface="Wingdings" panose="05000000000000000000" pitchFamily="2" charset="2"/>
+              <a:buChar char="v"/>
             </a:pPr>
             <a:r>
               <a:rPr lang="en-IE" sz="2800" spc="300" dirty="0"/>
-              <a:t>Conclusion</a:t>
+              <a:t> Conclusion</a:t>
             </a:r>
           </a:p>
           <a:p>
@@ -4592,6 +4605,24 @@
             </a:r>
           </a:p>
           <a:p>
+            <a:r>
+              <a:rPr lang="pl-PL" dirty="0"/>
+              <a:t>Improve our team work skills.</a:t>
+            </a:r>
+          </a:p>
+          <a:p>
+            <a:r>
+              <a:rPr lang="pl-PL" dirty="0"/>
+              <a:t>Learn more about Unity, Github, Git and SQLite (new for us).</a:t>
+            </a:r>
+          </a:p>
+          <a:p>
+            <a:r>
+              <a:rPr lang="pl-PL" dirty="0"/>
+              <a:t>Design the graphics by ourselves.</a:t>
+            </a:r>
+          </a:p>
+          <a:p>
             <a:endParaRPr lang="en-IE" dirty="0"/>
           </a:p>
         </p:txBody>
@@ -4795,8 +4826,53 @@
           <a:p>
             <a:r>
               <a:rPr lang="en-IE" dirty="0"/>
-              <a:t>First of all, we had a problem with the project idea. We had a couple of ideas such as, a website with </a:t>
-            </a:r>
+              <a:t>First of all, we had a problem with the project idea. We had a couple of ideas such as, a</a:t>
+            </a:r>
+            <a:r>
+              <a:rPr lang="pl-PL" dirty="0"/>
+              <a:t> to-do list website, a shop and the one that we picked – memory game.</a:t>
+            </a:r>
+          </a:p>
+          <a:p>
+            <a:r>
+              <a:rPr lang="pl-PL" dirty="0"/>
+              <a:t>We had problems with choosing the right database. </a:t>
+            </a:r>
+          </a:p>
+          <a:p>
+            <a:pPr marL="457200" lvl="1" indent="-457200">
+              <a:buFont typeface="+mj-lt"/>
+              <a:buAutoNum type="arabicPeriod"/>
+            </a:pPr>
+            <a:r>
+              <a:rPr lang="pl-PL" dirty="0"/>
+              <a:t>MySQL</a:t>
+            </a:r>
+          </a:p>
+          <a:p>
+            <a:pPr marL="457200" lvl="1" indent="-457200">
+              <a:buFont typeface="+mj-lt"/>
+              <a:buAutoNum type="arabicPeriod"/>
+            </a:pPr>
+            <a:r>
+              <a:rPr lang="pl-PL" dirty="0"/>
+              <a:t>SQLite</a:t>
+            </a:r>
+          </a:p>
+          <a:p>
+            <a:r>
+              <a:rPr lang="pl-PL" dirty="0"/>
+              <a:t>Setting up the database was also difficult. But we found tutorials and got it work as expected.</a:t>
+            </a:r>
+          </a:p>
+          <a:p>
+            <a:r>
+              <a:rPr lang="pl-PL" dirty="0"/>
+              <a:t>The last problem was with the score that was not being passed on from one script to another, because of the scene being switched. Unfortunately we have not fixed it.</a:t>
+            </a:r>
+          </a:p>
+          <a:p>
+            <a:endParaRPr lang="en-IE" dirty="0"/>
           </a:p>
         </p:txBody>
       </p:sp>
@@ -4892,13 +4968,29 @@
           <a:p>
             <a:r>
               <a:rPr lang="en-IE" dirty="0"/>
-              <a:t>In conclusion we have created a working memory game that allows the user to turn on and off the sounds in the game, to pick the levels (Easy, Medium and Hard) and other features which haven’t been fully finished.</a:t>
-            </a:r>
-          </a:p>
-          <a:p>
+              <a:t>In conclusion we have created a working memory game that allows the user to turn on and off the sounds in the game, to pick the levels (Easy, Medium and Hard) </a:t>
+            </a:r>
+            <a:r>
+              <a:rPr lang="pl-PL" dirty="0"/>
+              <a:t>and the database with a scoreboard, with not all functionality</a:t>
+            </a:r>
             <a:r>
               <a:rPr lang="en-IE" dirty="0"/>
-              <a:t>We have also got to know each other better as team mates on the team.</a:t>
+              <a:t>.</a:t>
+            </a:r>
+          </a:p>
+          <a:p>
+            <a:r>
+              <a:rPr lang="en-IE" dirty="0"/>
+              <a:t>We have also got to know each other better as team mate</a:t>
+            </a:r>
+            <a:r>
+              <a:rPr lang="pl-PL" dirty="0"/>
+              <a:t>s and friends</a:t>
+            </a:r>
+            <a:r>
+              <a:rPr lang="en-IE" dirty="0"/>
+              <a:t>.</a:t>
             </a:r>
           </a:p>
           <a:p>
@@ -4912,12 +5004,11 @@
             </a:r>
             <a:r>
               <a:rPr lang="en-IE" dirty="0"/>
-              <a:t>, Unity and in general Project planning </a:t>
-            </a:r>
-            <a:r>
-              <a:rPr lang="en-IE"/>
-              <a:t>and execution.</a:t>
-            </a:r>
+              <a:t>, Unity and in general Project planning and execution.</a:t>
+            </a:r>
+            <a:endParaRPr lang="pl-PL" dirty="0"/>
+          </a:p>
+          <a:p>
             <a:endParaRPr lang="en-IE" dirty="0"/>
           </a:p>
         </p:txBody>

</xml_diff>

<commit_message>
Changed small mistakes in the text of Presentation
</commit_message>
<xml_diff>
--- a/Presentation.pptx
+++ b/Presentation.pptx
@@ -5174,7 +5174,22 @@
                 <a:latin typeface="Times New Roman" panose="02020603050405020304" pitchFamily="18" charset="0"/>
                 <a:ea typeface="Calibri" panose="020F0502020204030204" pitchFamily="34" charset="0"/>
               </a:rPr>
-              <a:t>The main idea of the is to match all the symbols on the cards.</a:t>
+              <a:t>The main idea of the </a:t>
+            </a:r>
+            <a:r>
+              <a:rPr lang="pl-PL" sz="1800" dirty="0">
+                <a:latin typeface="Times New Roman" panose="02020603050405020304" pitchFamily="18" charset="0"/>
+                <a:ea typeface="Calibri" panose="020F0502020204030204" pitchFamily="34" charset="0"/>
+              </a:rPr>
+              <a:t>game is</a:t>
+            </a:r>
+            <a:r>
+              <a:rPr lang="en-GB" sz="1800" dirty="0">
+                <a:effectLst/>
+                <a:latin typeface="Times New Roman" panose="02020603050405020304" pitchFamily="18" charset="0"/>
+                <a:ea typeface="Calibri" panose="020F0502020204030204" pitchFamily="34" charset="0"/>
+              </a:rPr>
+              <a:t> to match all the symbols on the cards.</a:t>
             </a:r>
           </a:p>
           <a:p>
@@ -5189,7 +5204,35 @@
                 <a:latin typeface="Times New Roman" panose="02020603050405020304" pitchFamily="18" charset="0"/>
                 <a:ea typeface="Calibri" panose="020F0502020204030204" pitchFamily="34" charset="0"/>
               </a:rPr>
-              <a:t>The play has a menu at the start where they can select play or change options.</a:t>
+              <a:t>The play has a menu at the start where they can select play</a:t>
+            </a:r>
+            <a:r>
+              <a:rPr lang="pl-PL" sz="1800" dirty="0">
+                <a:latin typeface="Times New Roman" panose="02020603050405020304" pitchFamily="18" charset="0"/>
+                <a:ea typeface="Calibri" panose="020F0502020204030204" pitchFamily="34" charset="0"/>
+              </a:rPr>
+              <a:t>,</a:t>
+            </a:r>
+            <a:r>
+              <a:rPr lang="en-GB" sz="1800" dirty="0">
+                <a:latin typeface="Times New Roman" panose="02020603050405020304" pitchFamily="18" charset="0"/>
+                <a:ea typeface="Calibri" panose="020F0502020204030204" pitchFamily="34" charset="0"/>
+              </a:rPr>
+              <a:t> change options</a:t>
+            </a:r>
+            <a:r>
+              <a:rPr lang="pl-PL" sz="1800" dirty="0">
+                <a:latin typeface="Times New Roman" panose="02020603050405020304" pitchFamily="18" charset="0"/>
+                <a:ea typeface="Calibri" panose="020F0502020204030204" pitchFamily="34" charset="0"/>
+              </a:rPr>
+              <a:t> or to exit the game</a:t>
+            </a:r>
+            <a:r>
+              <a:rPr lang="en-GB" sz="1800" dirty="0">
+                <a:latin typeface="Times New Roman" panose="02020603050405020304" pitchFamily="18" charset="0"/>
+                <a:ea typeface="Calibri" panose="020F0502020204030204" pitchFamily="34" charset="0"/>
+              </a:rPr>
+              <a:t>.</a:t>
             </a:r>
           </a:p>
           <a:p>
@@ -5205,7 +5248,21 @@
                 <a:latin typeface="Times New Roman" panose="02020603050405020304" pitchFamily="18" charset="0"/>
                 <a:ea typeface="Calibri" panose="020F0502020204030204" pitchFamily="34" charset="0"/>
               </a:rPr>
-              <a:t>The user has 3 modes to pick when playing easy, normal or hard.</a:t>
+              <a:t>The user has </a:t>
+            </a:r>
+            <a:r>
+              <a:rPr lang="pl-PL" sz="1800" dirty="0">
+                <a:latin typeface="Times New Roman" panose="02020603050405020304" pitchFamily="18" charset="0"/>
+                <a:ea typeface="Calibri" panose="020F0502020204030204" pitchFamily="34" charset="0"/>
+              </a:rPr>
+              <a:t>three</a:t>
+            </a:r>
+            <a:r>
+              <a:rPr lang="en-GB" sz="1800" dirty="0">
+                <a:latin typeface="Times New Roman" panose="02020603050405020304" pitchFamily="18" charset="0"/>
+                <a:ea typeface="Calibri" panose="020F0502020204030204" pitchFamily="34" charset="0"/>
+              </a:rPr>
+              <a:t> modes to pick when playing easy, normal or hard.</a:t>
             </a:r>
           </a:p>
           <a:p>
@@ -5252,7 +5309,19 @@
               <a:rPr lang="en-GB" sz="1800" dirty="0">
                 <a:latin typeface="Times New Roman" panose="02020603050405020304" pitchFamily="18" charset="0"/>
               </a:rPr>
-              <a:t>And the database is done using SQLite.</a:t>
+              <a:t>And the </a:t>
+            </a:r>
+            <a:r>
+              <a:rPr lang="pl-PL" sz="1800" dirty="0">
+                <a:latin typeface="Times New Roman" panose="02020603050405020304" pitchFamily="18" charset="0"/>
+              </a:rPr>
+              <a:t>database that we are using is SQLite</a:t>
+            </a:r>
+            <a:r>
+              <a:rPr lang="en-GB" sz="1800" dirty="0">
+                <a:latin typeface="Times New Roman" panose="02020603050405020304" pitchFamily="18" charset="0"/>
+              </a:rPr>
+              <a:t>.</a:t>
             </a:r>
             <a:endParaRPr lang="en-IE" dirty="0"/>
           </a:p>
@@ -5359,6 +5428,13 @@
               <a:rPr lang="en-IE" dirty="0"/>
               <a:t>We have encountered numerous problems along the way of making this project.</a:t>
             </a:r>
+            <a:endParaRPr lang="pl-PL" dirty="0"/>
+          </a:p>
+          <a:p>
+            <a:pPr marL="0" indent="0">
+              <a:buNone/>
+            </a:pPr>
+            <a:endParaRPr lang="en-IE" dirty="0"/>
           </a:p>
           <a:p>
             <a:r>
@@ -5405,7 +5481,7 @@
           <a:p>
             <a:r>
               <a:rPr lang="pl-PL" dirty="0"/>
-              <a:t>Setting up the database was also difficult. But we found tutorials and got it work as expected.</a:t>
+              <a:t>Setting up the database was also difficult. But we found tutorials and got it to work as expected.</a:t>
             </a:r>
           </a:p>
           <a:p>

</xml_diff>